<commit_message>
Added math game as a demo, changed system of game savings.
</commit_message>
<xml_diff>
--- a/TamaBot.pptx
+++ b/TamaBot.pptx
@@ -13,6 +13,7 @@
     <p:sldId id="261" r:id="rId8"/>
     <p:sldId id="262" r:id="rId9"/>
     <p:sldId id="263" r:id="rId10"/>
+    <p:sldId id="264" r:id="rId11"/>
   </p:sldIdLst>
   <p:sldSz cx="12192000" cy="6858000"/>
   <p:notesSz cx="6858000" cy="9144000"/>
@@ -2380,9 +2381,15 @@
 <p:sldMaster xmlns:a="http://schemas.openxmlformats.org/drawingml/2006/main" xmlns:r="http://schemas.openxmlformats.org/officeDocument/2006/relationships" xmlns:p="http://schemas.openxmlformats.org/presentationml/2006/main">
   <p:cSld>
     <p:bg>
-      <p:bgRef idx="1001">
-        <a:schemeClr val="bg1"/>
-      </p:bgRef>
+      <p:bgPr>
+        <a:blipFill rotWithShape="0">
+          <a:blip r:embed="rId12"/>
+          <a:stretch>
+            <a:fillRect/>
+          </a:stretch>
+        </a:blipFill>
+        <a:effectLst/>
+      </p:bgPr>
     </p:bg>
     <p:spTree>
       <p:nvGrpSpPr>
@@ -2939,12 +2946,18 @@
           <a:p>
             <a:r>
               <a:rPr lang="x-none" altLang="">
+                <a:solidFill>
+                  <a:schemeClr val="bg1"/>
+                </a:solidFill>
                 <a:latin typeface="Ubuntu" charset="0"/>
                 <a:ea typeface="Ubuntu" charset="0"/>
               </a:rPr>
               <a:t>TamaBot</a:t>
             </a:r>
             <a:endParaRPr lang="x-none" altLang="">
+              <a:solidFill>
+                <a:schemeClr val="bg1"/>
+              </a:solidFill>
               <a:latin typeface="Ubuntu" charset="0"/>
               <a:ea typeface="Ubuntu" charset="0"/>
             </a:endParaRPr>
@@ -2967,25 +2980,37 @@
           <a:p>
             <a:r>
               <a:rPr lang="x-none" altLang="">
+                <a:solidFill>
+                  <a:schemeClr val="bg1"/>
+                </a:solidFill>
                 <a:latin typeface="Ubuntu" charset="0"/>
                 <a:ea typeface="Ubuntu" charset="0"/>
               </a:rPr>
-              <a:t>Projek zliczyniowy z Python'a </a:t>
+              <a:t>Projekt zliczyniowy z Python'a </a:t>
             </a:r>
             <a:br>
               <a:rPr lang="x-none" altLang="">
+                <a:solidFill>
+                  <a:schemeClr val="bg1"/>
+                </a:solidFill>
                 <a:latin typeface="Ubuntu" charset="0"/>
                 <a:ea typeface="Ubuntu" charset="0"/>
               </a:rPr>
             </a:br>
             <a:r>
               <a:rPr lang="x-none" altLang="">
+                <a:solidFill>
+                  <a:schemeClr val="bg1"/>
+                </a:solidFill>
                 <a:latin typeface="Ubuntu" charset="0"/>
                 <a:ea typeface="Ubuntu" charset="0"/>
               </a:rPr>
               <a:t>Autor: Oleksandr Fedoruk</a:t>
             </a:r>
             <a:endParaRPr lang="x-none" altLang="">
+              <a:solidFill>
+                <a:schemeClr val="bg1"/>
+              </a:solidFill>
               <a:latin typeface="Ubuntu" charset="0"/>
               <a:ea typeface="Ubuntu" charset="0"/>
             </a:endParaRPr>
@@ -3026,12 +3051,18 @@
           <a:p>
             <a:r>
               <a:rPr lang="x-none" altLang="">
+                <a:solidFill>
+                  <a:schemeClr val="bg1"/>
+                </a:solidFill>
                 <a:latin typeface="Ubuntu" charset="0"/>
                 <a:ea typeface="Ubuntu" charset="0"/>
               </a:rPr>
               <a:t>Plan prezentacji</a:t>
             </a:r>
             <a:endParaRPr lang="x-none" altLang="">
+              <a:solidFill>
+                <a:schemeClr val="bg1"/>
+              </a:solidFill>
               <a:latin typeface="Ubuntu" charset="0"/>
               <a:ea typeface="Ubuntu" charset="0"/>
             </a:endParaRPr>
@@ -3057,12 +3088,18 @@
             </a:pPr>
             <a:r>
               <a:rPr lang="x-none" altLang="">
+                <a:solidFill>
+                  <a:schemeClr val="bg1"/>
+                </a:solidFill>
                 <a:latin typeface="Ubuntu" charset="0"/>
                 <a:ea typeface="Ubuntu" charset="0"/>
               </a:rPr>
               <a:t>Pomysł</a:t>
             </a:r>
             <a:endParaRPr lang="x-none" altLang="">
+              <a:solidFill>
+                <a:schemeClr val="bg1"/>
+              </a:solidFill>
               <a:latin typeface="Ubuntu" charset="0"/>
               <a:ea typeface="Ubuntu" charset="0"/>
             </a:endParaRPr>
@@ -3073,12 +3110,18 @@
             </a:pPr>
             <a:r>
               <a:rPr lang="x-none" altLang="">
+                <a:solidFill>
+                  <a:schemeClr val="bg1"/>
+                </a:solidFill>
                 <a:latin typeface="Ubuntu" charset="0"/>
                 <a:ea typeface="Ubuntu" charset="0"/>
               </a:rPr>
               <a:t>Dlaczego telegram bot?</a:t>
             </a:r>
             <a:endParaRPr lang="x-none" altLang="">
+              <a:solidFill>
+                <a:schemeClr val="bg1"/>
+              </a:solidFill>
               <a:latin typeface="Ubuntu" charset="0"/>
               <a:ea typeface="Ubuntu" charset="0"/>
             </a:endParaRPr>
@@ -3089,12 +3132,18 @@
             </a:pPr>
             <a:r>
               <a:rPr lang="x-none" altLang="">
+                <a:solidFill>
+                  <a:schemeClr val="bg1"/>
+                </a:solidFill>
                 <a:latin typeface="Ubuntu" charset="0"/>
                 <a:ea typeface="Ubuntu" charset="0"/>
               </a:rPr>
               <a:t>Dlaczego tamagotchi?</a:t>
             </a:r>
             <a:endParaRPr lang="x-none" altLang="">
+              <a:solidFill>
+                <a:schemeClr val="bg1"/>
+              </a:solidFill>
               <a:latin typeface="Ubuntu" charset="0"/>
               <a:ea typeface="Ubuntu" charset="0"/>
             </a:endParaRPr>
@@ -3105,12 +3154,18 @@
             </a:pPr>
             <a:r>
               <a:rPr lang="x-none" altLang="">
+                <a:solidFill>
+                  <a:schemeClr val="bg1"/>
+                </a:solidFill>
                 <a:latin typeface="Ubuntu" charset="0"/>
                 <a:ea typeface="Ubuntu" charset="0"/>
               </a:rPr>
               <a:t>Sposób realizacji </a:t>
             </a:r>
             <a:endParaRPr lang="x-none" altLang="">
+              <a:solidFill>
+                <a:schemeClr val="bg1"/>
+              </a:solidFill>
               <a:latin typeface="Ubuntu" charset="0"/>
               <a:ea typeface="Ubuntu" charset="0"/>
             </a:endParaRPr>
@@ -3121,12 +3176,18 @@
             </a:pPr>
             <a:r>
               <a:rPr lang="x-none" altLang="">
+                <a:solidFill>
+                  <a:schemeClr val="bg1"/>
+                </a:solidFill>
                 <a:latin typeface="Ubuntu" charset="0"/>
                 <a:ea typeface="Ubuntu" charset="0"/>
               </a:rPr>
               <a:t>Ogólny opis działania programu </a:t>
             </a:r>
             <a:endParaRPr lang="x-none" altLang="">
+              <a:solidFill>
+                <a:schemeClr val="bg1"/>
+              </a:solidFill>
               <a:latin typeface="Ubuntu" charset="0"/>
               <a:ea typeface="Ubuntu" charset="0"/>
             </a:endParaRPr>
@@ -3137,12 +3198,18 @@
             </a:pPr>
             <a:r>
               <a:rPr lang="x-none" altLang="">
+                <a:solidFill>
+                  <a:schemeClr val="bg1"/>
+                </a:solidFill>
                 <a:latin typeface="Ubuntu" charset="0"/>
                 <a:ea typeface="Ubuntu" charset="0"/>
               </a:rPr>
               <a:t>Szczegóły działania niektórych momentów </a:t>
             </a:r>
             <a:endParaRPr lang="x-none" altLang="">
+              <a:solidFill>
+                <a:schemeClr val="bg1"/>
+              </a:solidFill>
               <a:latin typeface="Ubuntu" charset="0"/>
               <a:ea typeface="Ubuntu" charset="0"/>
             </a:endParaRPr>
@@ -3153,12 +3220,18 @@
             </a:pPr>
             <a:r>
               <a:rPr lang="x-none" altLang="">
+                <a:solidFill>
+                  <a:schemeClr val="bg1"/>
+                </a:solidFill>
                 <a:latin typeface="Ubuntu" charset="0"/>
                 <a:ea typeface="Ubuntu" charset="0"/>
               </a:rPr>
               <a:t>Cenność programu według wiedzy z Python'a</a:t>
             </a:r>
             <a:endParaRPr lang="x-none" altLang="">
+              <a:solidFill>
+                <a:schemeClr val="bg1"/>
+              </a:solidFill>
               <a:latin typeface="Ubuntu" charset="0"/>
               <a:ea typeface="Ubuntu" charset="0"/>
             </a:endParaRPr>
@@ -3169,12 +3242,18 @@
             </a:pPr>
             <a:r>
               <a:rPr lang="x-none" altLang="">
+                <a:solidFill>
+                  <a:schemeClr val="bg1"/>
+                </a:solidFill>
                 <a:latin typeface="Ubuntu" charset="0"/>
                 <a:ea typeface="Ubuntu" charset="0"/>
               </a:rPr>
               <a:t>Prezentacja działania programu </a:t>
             </a:r>
             <a:endParaRPr lang="x-none" altLang="">
+              <a:solidFill>
+                <a:schemeClr val="bg1"/>
+              </a:solidFill>
               <a:latin typeface="Ubuntu" charset="0"/>
               <a:ea typeface="Ubuntu" charset="0"/>
             </a:endParaRPr>
@@ -3185,12 +3264,18 @@
             </a:pPr>
             <a:r>
               <a:rPr lang="x-none" altLang="">
+                <a:solidFill>
+                  <a:schemeClr val="bg1"/>
+                </a:solidFill>
                 <a:latin typeface="Ubuntu" charset="0"/>
                 <a:ea typeface="Ubuntu" charset="0"/>
               </a:rPr>
               <a:t>Pytania</a:t>
             </a:r>
             <a:endParaRPr lang="x-none" altLang="">
+              <a:solidFill>
+                <a:schemeClr val="bg1"/>
+              </a:solidFill>
               <a:latin typeface="Ubuntu" charset="0"/>
               <a:ea typeface="Ubuntu" charset="0"/>
             </a:endParaRPr>
@@ -3225,18 +3310,31 @@
             <p:ph type="title"/>
           </p:nvPr>
         </p:nvSpPr>
-        <p:spPr/>
-        <p:txBody>
-          <a:bodyPr/>
-          <a:p>
-            <a:r>
-              <a:rPr lang="x-none" altLang="">
+        <p:spPr>
+          <a:xfrm>
+            <a:off x="838200" y="624205"/>
+            <a:ext cx="10515600" cy="1325563"/>
+          </a:xfrm>
+        </p:spPr>
+        <p:txBody>
+          <a:bodyPr>
+            <a:noAutofit/>
+          </a:bodyPr>
+          <a:p>
+            <a:r>
+              <a:rPr lang="x-none" altLang="" sz="9600">
+                <a:solidFill>
+                  <a:schemeClr val="bg1"/>
+                </a:solidFill>
                 <a:latin typeface="Ubuntu" charset="0"/>
                 <a:ea typeface="Ubuntu" charset="0"/>
               </a:rPr>
               <a:t>Pomysł</a:t>
             </a:r>
-            <a:endParaRPr lang="x-none" altLang="">
+            <a:endParaRPr lang="x-none" altLang="" sz="9600">
+              <a:solidFill>
+                <a:schemeClr val="bg1"/>
+              </a:solidFill>
               <a:latin typeface="Ubuntu" charset="0"/>
               <a:ea typeface="Ubuntu" charset="0"/>
             </a:endParaRPr>
@@ -3277,12 +3375,18 @@
           <a:p>
             <a:r>
               <a:rPr lang="x-none" altLang="">
+                <a:solidFill>
+                  <a:schemeClr val="bg1"/>
+                </a:solidFill>
                 <a:latin typeface="Ubuntu" charset="0"/>
                 <a:ea typeface="Ubuntu" charset="0"/>
               </a:rPr>
               <a:t>Dlaczego Telegram bot? </a:t>
             </a:r>
             <a:endParaRPr lang="x-none" altLang="">
+              <a:solidFill>
+                <a:schemeClr val="bg1"/>
+              </a:solidFill>
               <a:latin typeface="Ubuntu" charset="0"/>
               <a:ea typeface="Ubuntu" charset="0"/>
             </a:endParaRPr>
@@ -3306,12 +3410,18 @@
             <a:pPr marL="457200" indent="-457200"/>
             <a:r>
               <a:rPr lang="x-none" altLang="">
+                <a:solidFill>
+                  <a:schemeClr val="bg1"/>
+                </a:solidFill>
                 <a:latin typeface="Ubuntu" charset="0"/>
                 <a:ea typeface="Ubuntu" charset="0"/>
               </a:rPr>
               <a:t>Jestem użytkownikiem Telegram'u od czasów beta testu</a:t>
             </a:r>
             <a:endParaRPr lang="x-none" altLang="">
+              <a:solidFill>
+                <a:schemeClr val="bg1"/>
+              </a:solidFill>
               <a:latin typeface="Ubuntu" charset="0"/>
               <a:ea typeface="Ubuntu" charset="0"/>
             </a:endParaRPr>
@@ -3320,12 +3430,18 @@
             <a:pPr marL="457200" indent="-457200"/>
             <a:r>
               <a:rPr lang="x-none" altLang="">
+                <a:solidFill>
+                  <a:schemeClr val="bg1"/>
+                </a:solidFill>
                 <a:latin typeface="Ubuntu" charset="0"/>
                 <a:ea typeface="Ubuntu" charset="0"/>
               </a:rPr>
               <a:t>Chat boty - nowa tendencja serwisów webowych</a:t>
             </a:r>
             <a:endParaRPr lang="x-none" altLang="">
+              <a:solidFill>
+                <a:schemeClr val="bg1"/>
+              </a:solidFill>
               <a:latin typeface="Ubuntu" charset="0"/>
               <a:ea typeface="Ubuntu" charset="0"/>
             </a:endParaRPr>
@@ -3334,12 +3450,18 @@
             <a:pPr marL="457200" indent="-457200"/>
             <a:r>
               <a:rPr lang="x-none" altLang="">
+                <a:solidFill>
+                  <a:schemeClr val="bg1"/>
+                </a:solidFill>
                 <a:latin typeface="Ubuntu" charset="0"/>
                 <a:ea typeface="Ubuntu" charset="0"/>
               </a:rPr>
               <a:t>Lubię kotów </a:t>
             </a:r>
             <a:endParaRPr lang="x-none" altLang="">
+              <a:solidFill>
+                <a:schemeClr val="bg1"/>
+              </a:solidFill>
               <a:latin typeface="Ubuntu" charset="0"/>
               <a:ea typeface="Ubuntu" charset="0"/>
             </a:endParaRPr>
@@ -3347,6 +3469,9 @@
           <a:p>
             <a:pPr marL="457200" indent="-457200"/>
             <a:endParaRPr lang="x-none" altLang="">
+              <a:solidFill>
+                <a:schemeClr val="bg1"/>
+              </a:solidFill>
               <a:latin typeface="Ubuntu" charset="0"/>
               <a:ea typeface="Ubuntu" charset="0"/>
             </a:endParaRPr>
@@ -3387,15 +3512,22 @@
           <a:p>
             <a:r>
               <a:rPr lang="x-none" altLang="en-US">
+                <a:solidFill>
+                  <a:schemeClr val="bg1"/>
+                </a:solidFill>
                 <a:latin typeface="Ubuntu" charset="0"/>
                 <a:ea typeface="Ubuntu" charset="0"/>
                 <a:sym typeface="+mn-ea"/>
               </a:rPr>
               <a:t>Dlaczego Tamagotchi?</a:t>
             </a:r>
-            <a:endParaRPr lang="x-none" altLang="">
+            <a:endParaRPr lang="x-none" altLang="en-US">
+              <a:solidFill>
+                <a:schemeClr val="bg1"/>
+              </a:solidFill>
               <a:latin typeface="Ubuntu" charset="0"/>
               <a:ea typeface="Ubuntu" charset="0"/>
+              <a:sym typeface="+mn-ea"/>
             </a:endParaRPr>
           </a:p>
         </p:txBody>
@@ -3416,12 +3548,18 @@
           <a:p>
             <a:r>
               <a:rPr lang="x-none" altLang="">
+                <a:solidFill>
+                  <a:schemeClr val="bg1"/>
+                </a:solidFill>
                 <a:latin typeface="Ubuntu" charset="0"/>
                 <a:ea typeface="Ubuntu" charset="0"/>
               </a:rPr>
               <a:t>Prosta, ale ciekawa zabawka</a:t>
             </a:r>
             <a:endParaRPr lang="x-none" altLang="">
+              <a:solidFill>
+                <a:schemeClr val="bg1"/>
+              </a:solidFill>
               <a:latin typeface="Ubuntu" charset="0"/>
               <a:ea typeface="Ubuntu" charset="0"/>
             </a:endParaRPr>
@@ -3429,12 +3567,18 @@
           <a:p>
             <a:r>
               <a:rPr lang="x-none" altLang="">
+                <a:solidFill>
+                  <a:schemeClr val="bg1"/>
+                </a:solidFill>
                 <a:latin typeface="Ubuntu" charset="0"/>
                 <a:ea typeface="Ubuntu" charset="0"/>
               </a:rPr>
               <a:t>Nigdy nie miałem Tamagotchi</a:t>
             </a:r>
             <a:endParaRPr lang="x-none" altLang="">
+              <a:solidFill>
+                <a:schemeClr val="bg1"/>
+              </a:solidFill>
               <a:latin typeface="Ubuntu" charset="0"/>
               <a:ea typeface="Ubuntu" charset="0"/>
             </a:endParaRPr>
@@ -3442,24 +3586,36 @@
           <a:p>
             <a:r>
               <a:rPr lang="x-none" altLang="">
+                <a:solidFill>
+                  <a:schemeClr val="bg1"/>
+                </a:solidFill>
                 <a:latin typeface="Ubuntu" charset="0"/>
                 <a:ea typeface="Ubuntu" charset="0"/>
               </a:rPr>
               <a:t>Projekt będzie prosty do rozszerzenia</a:t>
             </a:r>
             <a:endParaRPr lang="x-none" altLang="">
+              <a:solidFill>
+                <a:schemeClr val="bg1"/>
+              </a:solidFill>
               <a:latin typeface="Ubuntu" charset="0"/>
               <a:ea typeface="Ubuntu" charset="0"/>
             </a:endParaRPr>
           </a:p>
           <a:p>
             <a:endParaRPr lang="x-none" altLang="">
+              <a:solidFill>
+                <a:schemeClr val="bg1"/>
+              </a:solidFill>
               <a:latin typeface="Ubuntu" charset="0"/>
               <a:ea typeface="Ubuntu" charset="0"/>
             </a:endParaRPr>
           </a:p>
           <a:p>
             <a:endParaRPr lang="x-none" altLang="">
+              <a:solidFill>
+                <a:schemeClr val="bg1"/>
+              </a:solidFill>
               <a:latin typeface="Ubuntu" charset="0"/>
               <a:ea typeface="Ubuntu" charset="0"/>
             </a:endParaRPr>
@@ -3494,19 +3650,36 @@
             <p:ph type="title"/>
           </p:nvPr>
         </p:nvSpPr>
-        <p:spPr/>
-        <p:txBody>
-          <a:bodyPr/>
-          <a:p>
-            <a:r>
-              <a:rPr lang="x-none" altLang="en-US">
+        <p:spPr>
+          <a:xfrm>
+            <a:off x="838200" y="656590"/>
+            <a:ext cx="10515600" cy="1325563"/>
+          </a:xfrm>
+        </p:spPr>
+        <p:txBody>
+          <a:bodyPr>
+            <a:noAutofit/>
+          </a:bodyPr>
+          <a:p>
+            <a:r>
+              <a:rPr lang="x-none" altLang="en-US" sz="9600">
+                <a:solidFill>
+                  <a:schemeClr val="bg1"/>
+                </a:solidFill>
                 <a:latin typeface="Ubuntu" charset="0"/>
                 <a:ea typeface="Ubuntu" charset="0"/>
                 <a:sym typeface="+mn-ea"/>
               </a:rPr>
               <a:t>Sposób realizacji</a:t>
             </a:r>
-            <a:endParaRPr lang="" altLang="en-US"/>
+            <a:endParaRPr lang="x-none" altLang="en-US" sz="9600">
+              <a:solidFill>
+                <a:schemeClr val="bg1"/>
+              </a:solidFill>
+              <a:latin typeface="Ubuntu" charset="0"/>
+              <a:ea typeface="Ubuntu" charset="0"/>
+              <a:sym typeface="+mn-ea"/>
+            </a:endParaRPr>
           </a:p>
         </p:txBody>
       </p:sp>
@@ -3544,12 +3717,18 @@
           <a:p>
             <a:r>
               <a:rPr lang="x-none" altLang="en-US">
+                <a:solidFill>
+                  <a:schemeClr val="bg1"/>
+                </a:solidFill>
                 <a:latin typeface="Ubuntu" charset="0"/>
                 <a:ea typeface="Ubuntu" charset="0"/>
               </a:rPr>
               <a:t>Ogólny opis działania programu</a:t>
             </a:r>
             <a:endParaRPr lang="x-none" altLang="en-US">
+              <a:solidFill>
+                <a:schemeClr val="bg1"/>
+              </a:solidFill>
               <a:latin typeface="Ubuntu" charset="0"/>
               <a:ea typeface="Ubuntu" charset="0"/>
             </a:endParaRPr>
@@ -4293,13 +4472,23 @@
           <a:p>
             <a:r>
               <a:rPr lang="x-none" altLang="en-US">
+                <a:solidFill>
+                  <a:schemeClr val="bg1"/>
+                </a:solidFill>
                 <a:latin typeface="Ubuntu" charset="0"/>
                 <a:ea typeface="Ubuntu" charset="0"/>
                 <a:sym typeface="+mn-ea"/>
               </a:rPr>
               <a:t>Szczegóły działania niektórych momentów</a:t>
             </a:r>
-            <a:endParaRPr lang="" altLang="en-US"/>
+            <a:endParaRPr lang="x-none" altLang="en-US">
+              <a:solidFill>
+                <a:schemeClr val="bg1"/>
+              </a:solidFill>
+              <a:latin typeface="Ubuntu" charset="0"/>
+              <a:ea typeface="Ubuntu" charset="0"/>
+              <a:sym typeface="+mn-ea"/>
+            </a:endParaRPr>
           </a:p>
         </p:txBody>
       </p:sp>
@@ -4324,12 +4513,18 @@
           <a:p>
             <a:r>
               <a:rPr lang="x-none" altLang="">
+                <a:solidFill>
+                  <a:schemeClr val="bg1"/>
+                </a:solidFill>
                 <a:latin typeface="Ubuntu" charset="0"/>
                 <a:ea typeface="Ubuntu" charset="0"/>
               </a:rPr>
               <a:t>main.py</a:t>
             </a:r>
             <a:endParaRPr lang="x-none" altLang="">
+              <a:solidFill>
+                <a:schemeClr val="bg1"/>
+              </a:solidFill>
               <a:latin typeface="Ubuntu" charset="0"/>
               <a:ea typeface="Ubuntu" charset="0"/>
             </a:endParaRPr>
@@ -4338,6 +4533,9 @@
             <a:pPr lvl="1"/>
             <a:r>
               <a:rPr lang="" altLang="en-US">
+                <a:solidFill>
+                  <a:schemeClr val="bg1"/>
+                </a:solidFill>
                 <a:latin typeface="Ubuntu" charset="0"/>
                 <a:ea typeface="Ubuntu" charset="0"/>
               </a:rPr>
@@ -4345,12 +4543,18 @@
             </a:r>
             <a:r>
               <a:rPr lang="x-none" altLang="">
+                <a:solidFill>
+                  <a:schemeClr val="bg1"/>
+                </a:solidFill>
                 <a:latin typeface="Ubuntu" charset="0"/>
                 <a:ea typeface="Ubuntu" charset="0"/>
               </a:rPr>
               <a:t>- obliczenie nowych warości stanu kota.</a:t>
             </a:r>
             <a:endParaRPr lang="x-none" altLang="">
+              <a:solidFill>
+                <a:schemeClr val="bg1"/>
+              </a:solidFill>
               <a:latin typeface="Ubuntu" charset="0"/>
               <a:ea typeface="Ubuntu" charset="0"/>
             </a:endParaRPr>
@@ -4359,12 +4563,18 @@
             <a:pPr lvl="1"/>
             <a:r>
               <a:rPr lang="x-none" altLang="">
+                <a:solidFill>
+                  <a:schemeClr val="bg1"/>
+                </a:solidFill>
                 <a:latin typeface="Ubuntu" charset="0"/>
                 <a:ea typeface="Ubuntu" charset="0"/>
               </a:rPr>
               <a:t>auto_count - wątek (Thread), który co 10 minut wywołuje obliczneia i wiadomości-sygnały.</a:t>
             </a:r>
             <a:endParaRPr lang="x-none" altLang="">
+              <a:solidFill>
+                <a:schemeClr val="bg1"/>
+              </a:solidFill>
               <a:latin typeface="Ubuntu" charset="0"/>
               <a:ea typeface="Ubuntu" charset="0"/>
             </a:endParaRPr>
@@ -4373,12 +4583,18 @@
             <a:pPr lvl="0"/>
             <a:r>
               <a:rPr lang="x-none" altLang="">
+                <a:solidFill>
+                  <a:schemeClr val="bg1"/>
+                </a:solidFill>
                 <a:latin typeface="Ubuntu" charset="0"/>
                 <a:ea typeface="Ubuntu" charset="0"/>
               </a:rPr>
               <a:t>user_operations.py</a:t>
             </a:r>
             <a:endParaRPr lang="x-none" altLang="">
+              <a:solidFill>
+                <a:schemeClr val="bg1"/>
+              </a:solidFill>
               <a:latin typeface="Ubuntu" charset="0"/>
               <a:ea typeface="Ubuntu" charset="0"/>
             </a:endParaRPr>
@@ -4387,12 +4603,18 @@
             <a:pPr lvl="1"/>
             <a:r>
               <a:rPr lang="x-none" altLang="">
+                <a:solidFill>
+                  <a:schemeClr val="bg1"/>
+                </a:solidFill>
                 <a:latin typeface="Ubuntu" charset="0"/>
                 <a:ea typeface="Ubuntu" charset="0"/>
               </a:rPr>
               <a:t>pickle - modul do serializacji danych w plikach .save.</a:t>
             </a:r>
             <a:endParaRPr lang="x-none" altLang="">
+              <a:solidFill>
+                <a:schemeClr val="bg1"/>
+              </a:solidFill>
               <a:latin typeface="Ubuntu" charset="0"/>
               <a:ea typeface="Ubuntu" charset="0"/>
             </a:endParaRPr>
@@ -4401,12 +4623,18 @@
             <a:pPr lvl="1"/>
             <a:r>
               <a:rPr lang="x-none" altLang="">
+                <a:solidFill>
+                  <a:schemeClr val="bg1"/>
+                </a:solidFill>
                 <a:latin typeface="Ubuntu" charset="0"/>
                 <a:ea typeface="Ubuntu" charset="0"/>
               </a:rPr>
               <a:t>class Animal - główna klasa programu</a:t>
             </a:r>
             <a:endParaRPr lang="x-none" altLang="">
+              <a:solidFill>
+                <a:schemeClr val="bg1"/>
+              </a:solidFill>
               <a:latin typeface="Ubuntu" charset="0"/>
               <a:ea typeface="Ubuntu" charset="0"/>
             </a:endParaRPr>
@@ -4415,15 +4643,95 @@
             <a:pPr lvl="1"/>
             <a:r>
               <a:rPr lang="x-none" altLang="">
+                <a:solidFill>
+                  <a:schemeClr val="bg1"/>
+                </a:solidFill>
                 <a:latin typeface="Ubuntu" charset="0"/>
                 <a:ea typeface="Ubuntu" charset="0"/>
               </a:rPr>
               <a:t>*_user.py - 4 funkcje do zpisu, odczytu, tworzenia i isinięcia plików .save</a:t>
             </a:r>
             <a:endParaRPr lang="x-none" altLang="">
+              <a:solidFill>
+                <a:schemeClr val="bg1"/>
+              </a:solidFill>
               <a:latin typeface="Ubuntu" charset="0"/>
               <a:ea typeface="Ubuntu" charset="0"/>
             </a:endParaRPr>
+          </a:p>
+        </p:txBody>
+      </p:sp>
+    </p:spTree>
+  </p:cSld>
+  <p:clrMapOvr>
+    <a:masterClrMapping/>
+  </p:clrMapOvr>
+</p:sld>
+</file>
+
+<file path=ppt/slides/slide9.xml><?xml version="1.0" encoding="utf-8"?>
+<p:sld xmlns:a="http://schemas.openxmlformats.org/drawingml/2006/main" xmlns:r="http://schemas.openxmlformats.org/officeDocument/2006/relationships" xmlns:p="http://schemas.openxmlformats.org/presentationml/2006/main">
+  <p:cSld>
+    <p:spTree>
+      <p:nvGrpSpPr>
+        <p:cNvPr id="1" name=""/>
+        <p:cNvGrpSpPr/>
+        <p:nvPr/>
+      </p:nvGrpSpPr>
+      <p:grpSpPr/>
+      <p:sp>
+        <p:nvSpPr>
+          <p:cNvPr id="2" name="Title 1"/>
+          <p:cNvSpPr>
+            <a:spLocks noGrp="1"/>
+          </p:cNvSpPr>
+          <p:nvPr>
+            <p:ph type="title"/>
+          </p:nvPr>
+        </p:nvSpPr>
+        <p:spPr/>
+        <p:txBody>
+          <a:bodyPr>
+            <a:normAutofit fontScale="90000"/>
+          </a:bodyPr>
+          <a:p>
+            <a:r>
+              <a:rPr lang="x-none" altLang="en-US">
+                <a:solidFill>
+                  <a:schemeClr val="bg1"/>
+                </a:solidFill>
+                <a:latin typeface="Ubuntu" charset="0"/>
+                <a:ea typeface="Ubuntu" charset="0"/>
+                <a:sym typeface="+mn-ea"/>
+              </a:rPr>
+              <a:t>Cenność programu według wiedzy z Python'a</a:t>
+            </a:r>
+            <a:endParaRPr lang="x-none" altLang="en-US">
+              <a:solidFill>
+                <a:schemeClr val="bg1"/>
+              </a:solidFill>
+              <a:latin typeface="Ubuntu" charset="0"/>
+              <a:ea typeface="Ubuntu" charset="0"/>
+              <a:sym typeface="+mn-ea"/>
+            </a:endParaRPr>
+          </a:p>
+        </p:txBody>
+      </p:sp>
+      <p:sp>
+        <p:nvSpPr>
+          <p:cNvPr id="3" name="Content Placeholder 2"/>
+          <p:cNvSpPr>
+            <a:spLocks noGrp="1"/>
+          </p:cNvSpPr>
+          <p:nvPr>
+            <p:ph idx="1"/>
+          </p:nvPr>
+        </p:nvSpPr>
+        <p:spPr/>
+        <p:txBody>
+          <a:bodyPr/>
+          <a:p>
+            <a:endParaRPr lang="" altLang="en-US"/>
           </a:p>
         </p:txBody>
       </p:sp>

</xml_diff>